<commit_message>
some changes with pptx and readme
</commit_message>
<xml_diff>
--- a/Project 2 _ Ames Housing Data and Kaggle Challenge.pptx
+++ b/Project 2 _ Ames Housing Data and Kaggle Challenge.pptx
@@ -964,8 +964,8 @@
         </p:nvSpPr>
         <p:spPr>
           <a:xfrm>
-            <a:off x="381188" y="685800"/>
-            <a:ext cx="6096300" cy="3429000"/>
+            <a:off x="381000" y="685800"/>
+            <a:ext cx="6096000" cy="3429000"/>
           </a:xfrm>
           <a:custGeom>
             <a:avLst/>
@@ -1068,8 +1068,8 @@
         </p:nvSpPr>
         <p:spPr>
           <a:xfrm>
-            <a:off x="381188" y="685800"/>
-            <a:ext cx="6096300" cy="3429000"/>
+            <a:off x="381000" y="685800"/>
+            <a:ext cx="6096000" cy="3429000"/>
           </a:xfrm>
           <a:custGeom>
             <a:avLst/>
@@ -8966,7 +8966,7 @@
         </p:blipFill>
         <p:spPr>
           <a:xfrm>
-            <a:off x="125750" y="1463300"/>
+            <a:off x="108350" y="1463300"/>
             <a:ext cx="6286525" cy="3437300"/>
           </a:xfrm>
           <a:prstGeom prst="rect">
@@ -9029,7 +9029,7 @@
         </p:nvSpPr>
         <p:spPr>
           <a:xfrm>
-            <a:off x="222025" y="786875"/>
+            <a:off x="229976" y="786875"/>
             <a:ext cx="6666300" cy="615600"/>
           </a:xfrm>
           <a:prstGeom prst="rect">
@@ -9296,7 +9296,7 @@
         </p:spPr>
         <p:txBody>
           <a:bodyPr spcFirstLastPara="1" wrap="square" lIns="91425" tIns="91425" rIns="91425" bIns="91425" anchor="ctr" anchorCtr="0">
-            <a:normAutofit/>
+            <a:normAutofit fontScale="90000"/>
           </a:bodyPr>
           <a:lstStyle/>
           <a:p>
@@ -9310,10 +9310,25 @@
               <a:buNone/>
             </a:pPr>
             <a:r>
-              <a:rPr lang="en"/>
+              <a:rPr lang="en-SG" dirty="0"/>
+              <a:t>S</a:t>
+            </a:r>
+            <a:r>
+              <a:rPr lang="en" dirty="0" err="1"/>
+              <a:t>ummary</a:t>
+            </a:r>
+            <a:r>
+              <a:rPr lang="en" dirty="0"/>
+              <a:t> and </a:t>
+            </a:r>
+            <a:br>
+              <a:rPr lang="en" dirty="0"/>
+            </a:br>
+            <a:r>
+              <a:rPr lang="en" dirty="0"/>
               <a:t>Recommendation</a:t>
             </a:r>
-            <a:endParaRPr/>
+            <a:endParaRPr dirty="0"/>
           </a:p>
         </p:txBody>
       </p:sp>
@@ -9485,7 +9500,7 @@
               </a:spcAft>
               <a:buNone/>
             </a:pPr>
-            <a:endParaRPr sz="2100">
+            <a:endParaRPr sz="2100" dirty="0">
               <a:solidFill>
                 <a:schemeClr val="dk1"/>
               </a:solidFill>
@@ -9504,7 +9519,7 @@
               </a:spcAft>
               <a:buNone/>
             </a:pPr>
-            <a:endParaRPr sz="1700">
+            <a:endParaRPr sz="1700" dirty="0">
               <a:solidFill>
                 <a:schemeClr val="dk1"/>
               </a:solidFill>
@@ -9523,31 +9538,7 @@
               </a:spcAft>
               <a:buNone/>
             </a:pPr>
-            <a:r>
-              <a:rPr lang="en" sz="1700">
-                <a:solidFill>
-                  <a:schemeClr val="dk1"/>
-                </a:solidFill>
-              </a:rPr>
-              <a:t>For those who’s budget are below average, and yet looking for a good quality properties, you can look at this 10 neighborhoods,  </a:t>
-            </a:r>
-            <a:r>
-              <a:rPr lang="en" sz="1700" i="1">
-                <a:solidFill>
-                  <a:schemeClr val="dk1"/>
-                </a:solidFill>
-              </a:rPr>
-              <a:t>NPkVill, NAmes, Blueste, Landmrk, SWISU, SawyerW, BrDale, BrkSide, Edwards and OldTown</a:t>
-            </a:r>
-            <a:r>
-              <a:rPr lang="en" sz="1700">
-                <a:solidFill>
-                  <a:schemeClr val="dk1"/>
-                </a:solidFill>
-              </a:rPr>
-              <a:t>, the properties were sold below average and yet the quality is above average.</a:t>
-            </a:r>
-            <a:endParaRPr sz="1700">
+            <a:endParaRPr lang="en" sz="1600" dirty="0">
               <a:solidFill>
                 <a:schemeClr val="dk1"/>
               </a:solidFill>
@@ -9566,7 +9557,29 @@
               </a:spcAft>
               <a:buNone/>
             </a:pPr>
-            <a:endParaRPr sz="1700">
+            <a:r>
+              <a:rPr lang="en" sz="1600" b="1" i="1" dirty="0">
+                <a:solidFill>
+                  <a:schemeClr val="dk1"/>
+                </a:solidFill>
+              </a:rPr>
+              <a:t>Summary:</a:t>
+            </a:r>
+          </a:p>
+          <a:p>
+            <a:pPr marL="457200" lvl="0" indent="0" algn="l" rtl="0">
+              <a:lnSpc>
+                <a:spcPct val="80000"/>
+              </a:lnSpc>
+              <a:spcBef>
+                <a:spcPts val="0"/>
+              </a:spcBef>
+              <a:spcAft>
+                <a:spcPts val="0"/>
+              </a:spcAft>
+              <a:buNone/>
+            </a:pPr>
+            <a:endParaRPr lang="en" sz="1700" b="1" i="1" dirty="0">
               <a:solidFill>
                 <a:schemeClr val="dk1"/>
               </a:solidFill>
@@ -9585,7 +9598,58 @@
               </a:spcAft>
               <a:buNone/>
             </a:pPr>
-            <a:endParaRPr sz="1700">
+            <a:r>
+              <a:rPr lang="en" sz="1400" dirty="0">
+                <a:solidFill>
+                  <a:schemeClr val="dk1"/>
+                </a:solidFill>
+              </a:rPr>
+              <a:t>	Overall Quality is the feature that has the most significant impact on the Sale Price.</a:t>
+            </a:r>
+          </a:p>
+          <a:p>
+            <a:pPr marL="457200" lvl="0" indent="0" algn="l" rtl="0">
+              <a:lnSpc>
+                <a:spcPct val="80000"/>
+              </a:lnSpc>
+              <a:spcBef>
+                <a:spcPts val="0"/>
+              </a:spcBef>
+              <a:spcAft>
+                <a:spcPts val="0"/>
+              </a:spcAft>
+              <a:buNone/>
+            </a:pPr>
+            <a:endParaRPr lang="en" sz="1600" dirty="0">
+              <a:solidFill>
+                <a:schemeClr val="dk1"/>
+              </a:solidFill>
+            </a:endParaRPr>
+          </a:p>
+          <a:p>
+            <a:pPr lvl="0" indent="0">
+              <a:lnSpc>
+                <a:spcPct val="80000"/>
+              </a:lnSpc>
+              <a:buNone/>
+            </a:pPr>
+            <a:r>
+              <a:rPr lang="en" sz="1600" b="1" i="1" dirty="0">
+                <a:solidFill>
+                  <a:schemeClr val="dk1"/>
+                </a:solidFill>
+              </a:rPr>
+              <a:t>Recommendation:</a:t>
+            </a:r>
+          </a:p>
+          <a:p>
+            <a:pPr lvl="0" indent="0">
+              <a:lnSpc>
+                <a:spcPct val="80000"/>
+              </a:lnSpc>
+              <a:buNone/>
+            </a:pPr>
+            <a:endParaRPr lang="en" sz="1700" dirty="0">
               <a:solidFill>
                 <a:schemeClr val="dk1"/>
               </a:solidFill>
@@ -9604,7 +9668,143 @@
               </a:spcAft>
               <a:buNone/>
             </a:pPr>
-            <a:endParaRPr sz="1700">
+            <a:r>
+              <a:rPr lang="en" sz="1400" dirty="0">
+                <a:solidFill>
+                  <a:schemeClr val="dk1"/>
+                </a:solidFill>
+              </a:rPr>
+              <a:t>For those who’s budget are below average, and yet looking for a good quality properties, they can check these 10 neighborhoods,  </a:t>
+            </a:r>
+            <a:r>
+              <a:rPr lang="en" sz="1400" i="1" dirty="0" err="1">
+                <a:solidFill>
+                  <a:schemeClr val="dk1"/>
+                </a:solidFill>
+              </a:rPr>
+              <a:t>NPkVill</a:t>
+            </a:r>
+            <a:r>
+              <a:rPr lang="en" sz="1400" i="1" dirty="0">
+                <a:solidFill>
+                  <a:schemeClr val="dk1"/>
+                </a:solidFill>
+              </a:rPr>
+              <a:t>, </a:t>
+            </a:r>
+            <a:r>
+              <a:rPr lang="en" sz="1400" i="1" dirty="0" err="1">
+                <a:solidFill>
+                  <a:schemeClr val="dk1"/>
+                </a:solidFill>
+              </a:rPr>
+              <a:t>NAmes</a:t>
+            </a:r>
+            <a:r>
+              <a:rPr lang="en" sz="1400" i="1" dirty="0">
+                <a:solidFill>
+                  <a:schemeClr val="dk1"/>
+                </a:solidFill>
+              </a:rPr>
+              <a:t>, </a:t>
+            </a:r>
+            <a:r>
+              <a:rPr lang="en" sz="1400" i="1" dirty="0" err="1">
+                <a:solidFill>
+                  <a:schemeClr val="dk1"/>
+                </a:solidFill>
+              </a:rPr>
+              <a:t>Blueste</a:t>
+            </a:r>
+            <a:r>
+              <a:rPr lang="en" sz="1400" i="1" dirty="0">
+                <a:solidFill>
+                  <a:schemeClr val="dk1"/>
+                </a:solidFill>
+              </a:rPr>
+              <a:t>, </a:t>
+            </a:r>
+            <a:r>
+              <a:rPr lang="en" sz="1400" i="1" dirty="0" err="1">
+                <a:solidFill>
+                  <a:schemeClr val="dk1"/>
+                </a:solidFill>
+              </a:rPr>
+              <a:t>Landmrk</a:t>
+            </a:r>
+            <a:r>
+              <a:rPr lang="en" sz="1400" i="1" dirty="0">
+                <a:solidFill>
+                  <a:schemeClr val="dk1"/>
+                </a:solidFill>
+              </a:rPr>
+              <a:t>, SWISU, </a:t>
+            </a:r>
+            <a:r>
+              <a:rPr lang="en" sz="1400" i="1" dirty="0" err="1">
+                <a:solidFill>
+                  <a:schemeClr val="dk1"/>
+                </a:solidFill>
+              </a:rPr>
+              <a:t>SawyerW</a:t>
+            </a:r>
+            <a:r>
+              <a:rPr lang="en" sz="1400" i="1" dirty="0">
+                <a:solidFill>
+                  <a:schemeClr val="dk1"/>
+                </a:solidFill>
+              </a:rPr>
+              <a:t>, </a:t>
+            </a:r>
+            <a:r>
+              <a:rPr lang="en" sz="1400" i="1" dirty="0" err="1">
+                <a:solidFill>
+                  <a:schemeClr val="dk1"/>
+                </a:solidFill>
+              </a:rPr>
+              <a:t>BrDale</a:t>
+            </a:r>
+            <a:r>
+              <a:rPr lang="en" sz="1400" i="1" dirty="0">
+                <a:solidFill>
+                  <a:schemeClr val="dk1"/>
+                </a:solidFill>
+              </a:rPr>
+              <a:t>, </a:t>
+            </a:r>
+            <a:r>
+              <a:rPr lang="en" sz="1400" i="1" dirty="0" err="1">
+                <a:solidFill>
+                  <a:schemeClr val="dk1"/>
+                </a:solidFill>
+              </a:rPr>
+              <a:t>BrkSide</a:t>
+            </a:r>
+            <a:r>
+              <a:rPr lang="en" sz="1400" i="1" dirty="0">
+                <a:solidFill>
+                  <a:schemeClr val="dk1"/>
+                </a:solidFill>
+              </a:rPr>
+              <a:t>, Edwards and </a:t>
+            </a:r>
+            <a:r>
+              <a:rPr lang="en" sz="1400" i="1" dirty="0" err="1">
+                <a:solidFill>
+                  <a:schemeClr val="dk1"/>
+                </a:solidFill>
+              </a:rPr>
+              <a:t>OldTown</a:t>
+            </a:r>
+            <a:r>
+              <a:rPr lang="en" sz="1400" dirty="0">
+                <a:solidFill>
+                  <a:schemeClr val="dk1"/>
+                </a:solidFill>
+              </a:rPr>
+              <a:t>, the properties were sold below average and still can choose a better range of quality properties.</a:t>
+            </a:r>
+            <a:endParaRPr sz="1400" dirty="0">
               <a:solidFill>
                 <a:schemeClr val="dk1"/>
               </a:solidFill>
@@ -9623,15 +9823,7 @@
               </a:spcAft>
               <a:buNone/>
             </a:pPr>
-            <a:r>
-              <a:rPr lang="en" sz="1700">
-                <a:solidFill>
-                  <a:schemeClr val="dk1"/>
-                </a:solidFill>
-              </a:rPr>
-              <a:t>You can also save some money by choosing properties that are not remodelled, and yet the quality rating is the same.</a:t>
-            </a:r>
-            <a:endParaRPr sz="1700">
+            <a:endParaRPr sz="1400" dirty="0">
               <a:solidFill>
                 <a:schemeClr val="dk1"/>
               </a:solidFill>
@@ -9650,7 +9842,7 @@
               </a:spcAft>
               <a:buNone/>
             </a:pPr>
-            <a:endParaRPr sz="1700">
+            <a:endParaRPr sz="1400" dirty="0">
               <a:solidFill>
                 <a:schemeClr val="dk1"/>
               </a:solidFill>
@@ -9669,7 +9861,15 @@
               </a:spcAft>
               <a:buNone/>
             </a:pPr>
-            <a:endParaRPr sz="1700">
+            <a:r>
+              <a:rPr lang="en" sz="1400" dirty="0">
+                <a:solidFill>
+                  <a:schemeClr val="dk1"/>
+                </a:solidFill>
+              </a:rPr>
+              <a:t>You can also save some money by choosing properties that are not remodeled, and yet the quality rating is the same.</a:t>
+            </a:r>
+            <a:endParaRPr sz="1400" dirty="0">
               <a:solidFill>
                 <a:schemeClr val="dk1"/>
               </a:solidFill>
@@ -9688,7 +9888,7 @@
               </a:spcAft>
               <a:buNone/>
             </a:pPr>
-            <a:endParaRPr sz="1700">
+            <a:endParaRPr sz="1700" dirty="0">
               <a:solidFill>
                 <a:schemeClr val="dk1"/>
               </a:solidFill>
@@ -9707,7 +9907,7 @@
               </a:spcAft>
               <a:buNone/>
             </a:pPr>
-            <a:endParaRPr sz="1700">
+            <a:endParaRPr sz="1700" dirty="0">
               <a:solidFill>
                 <a:schemeClr val="dk1"/>
               </a:solidFill>
@@ -9726,7 +9926,7 @@
               </a:spcAft>
               <a:buNone/>
             </a:pPr>
-            <a:endParaRPr sz="1700">
+            <a:endParaRPr sz="1700" dirty="0">
               <a:solidFill>
                 <a:schemeClr val="dk1"/>
               </a:solidFill>
@@ -9745,7 +9945,7 @@
               </a:spcAft>
               <a:buNone/>
             </a:pPr>
-            <a:endParaRPr sz="1700">
+            <a:endParaRPr sz="1700" dirty="0">
               <a:solidFill>
                 <a:schemeClr val="dk1"/>
               </a:solidFill>
@@ -9764,7 +9964,7 @@
               </a:spcAft>
               <a:buNone/>
             </a:pPr>
-            <a:endParaRPr sz="1700">
+            <a:endParaRPr sz="1700" dirty="0">
               <a:solidFill>
                 <a:schemeClr val="dk1"/>
               </a:solidFill>
@@ -9783,7 +9983,7 @@
               </a:spcAft>
               <a:buNone/>
             </a:pPr>
-            <a:endParaRPr sz="1700">
+            <a:endParaRPr sz="1700" dirty="0">
               <a:solidFill>
                 <a:schemeClr val="dk1"/>
               </a:solidFill>
@@ -9802,7 +10002,45 @@
               </a:spcAft>
               <a:buNone/>
             </a:pPr>
-            <a:endParaRPr sz="1700">
+            <a:endParaRPr sz="1700" dirty="0">
+              <a:solidFill>
+                <a:schemeClr val="dk1"/>
+              </a:solidFill>
+            </a:endParaRPr>
+          </a:p>
+          <a:p>
+            <a:pPr marL="457200" lvl="0" indent="0" algn="l" rtl="0">
+              <a:lnSpc>
+                <a:spcPct val="80000"/>
+              </a:lnSpc>
+              <a:spcBef>
+                <a:spcPts val="0"/>
+              </a:spcBef>
+              <a:spcAft>
+                <a:spcPts val="0"/>
+              </a:spcAft>
+              <a:buNone/>
+            </a:pPr>
+            <a:endParaRPr sz="1700" dirty="0">
+              <a:solidFill>
+                <a:schemeClr val="dk1"/>
+              </a:solidFill>
+            </a:endParaRPr>
+          </a:p>
+          <a:p>
+            <a:pPr marL="457200" lvl="0" indent="0" algn="l" rtl="0">
+              <a:lnSpc>
+                <a:spcPct val="80000"/>
+              </a:lnSpc>
+              <a:spcBef>
+                <a:spcPts val="0"/>
+              </a:spcBef>
+              <a:spcAft>
+                <a:spcPts val="0"/>
+              </a:spcAft>
+              <a:buNone/>
+            </a:pPr>
+            <a:endParaRPr sz="1700" dirty="0">
               <a:solidFill>
                 <a:schemeClr val="dk1"/>
               </a:solidFill>
@@ -9821,7 +10059,7 @@
               </a:spcAft>
               <a:buNone/>
             </a:pPr>
-            <a:endParaRPr sz="1700">
+            <a:endParaRPr sz="1700" dirty="0">
               <a:solidFill>
                 <a:schemeClr val="dk1"/>
               </a:solidFill>
@@ -9840,7 +10078,7 @@
               </a:spcAft>
               <a:buNone/>
             </a:pPr>
-            <a:endParaRPr sz="1700">
+            <a:endParaRPr sz="1700" dirty="0">
               <a:solidFill>
                 <a:schemeClr val="dk1"/>
               </a:solidFill>
@@ -11283,354 +11521,34 @@
       </p:sp>
       <p:pic>
         <p:nvPicPr>
-          <p:cNvPr id="125" name="Google Shape;125;p17"/>
-          <p:cNvPicPr preferRelativeResize="0"/>
+          <p:cNvPr id="2" name="Picture 1">
+            <a:extLst>
+              <a:ext uri="{FF2B5EF4-FFF2-40B4-BE49-F238E27FC236}">
+                <a16:creationId xmlns:a16="http://schemas.microsoft.com/office/drawing/2014/main" id="{1156B17C-3C6A-4A42-838F-EA47D8849311}"/>
+              </a:ext>
+            </a:extLst>
+          </p:cNvPr>
+          <p:cNvPicPr>
+            <a:picLocks noChangeAspect="1"/>
+          </p:cNvPicPr>
           <p:nvPr/>
         </p:nvPicPr>
         <p:blipFill>
-          <a:blip r:embed="rId3">
-            <a:alphaModFix/>
-          </a:blip>
+          <a:blip r:embed="rId3"/>
           <a:stretch>
             <a:fillRect/>
           </a:stretch>
         </p:blipFill>
         <p:spPr>
           <a:xfrm>
-            <a:off x="152400" y="1170200"/>
-            <a:ext cx="4605712" cy="3973299"/>
+            <a:off x="481008" y="1017800"/>
+            <a:ext cx="4155821" cy="3935896"/>
           </a:xfrm>
           <a:prstGeom prst="rect">
             <a:avLst/>
           </a:prstGeom>
-          <a:noFill/>
-          <a:ln>
-            <a:noFill/>
-          </a:ln>
         </p:spPr>
       </p:pic>
-      <p:sp>
-        <p:nvSpPr>
-          <p:cNvPr id="126" name="Google Shape;126;p17"/>
-          <p:cNvSpPr/>
-          <p:nvPr/>
-        </p:nvSpPr>
-        <p:spPr>
-          <a:xfrm>
-            <a:off x="1631700" y="3982325"/>
-            <a:ext cx="88800" cy="64500"/>
-          </a:xfrm>
-          <a:prstGeom prst="ellipse">
-            <a:avLst/>
-          </a:prstGeom>
-          <a:solidFill>
-            <a:schemeClr val="accent3"/>
-          </a:solidFill>
-          <a:ln w="9525" cap="flat" cmpd="sng">
-            <a:solidFill>
-              <a:schemeClr val="dk2"/>
-            </a:solidFill>
-            <a:prstDash val="solid"/>
-            <a:round/>
-            <a:headEnd type="none" w="sm" len="sm"/>
-            <a:tailEnd type="none" w="sm" len="sm"/>
-          </a:ln>
-        </p:spPr>
-        <p:txBody>
-          <a:bodyPr spcFirstLastPara="1" wrap="square" lIns="91425" tIns="91425" rIns="91425" bIns="91425" anchor="ctr" anchorCtr="0">
-            <a:noAutofit/>
-          </a:bodyPr>
-          <a:lstStyle/>
-          <a:p>
-            <a:pPr marL="0" lvl="0" indent="0" algn="l" rtl="0">
-              <a:spcBef>
-                <a:spcPts val="0"/>
-              </a:spcBef>
-              <a:spcAft>
-                <a:spcPts val="0"/>
-              </a:spcAft>
-              <a:buNone/>
-            </a:pPr>
-            <a:endParaRPr/>
-          </a:p>
-        </p:txBody>
-      </p:sp>
-      <p:sp>
-        <p:nvSpPr>
-          <p:cNvPr id="127" name="Google Shape;127;p17"/>
-          <p:cNvSpPr/>
-          <p:nvPr/>
-        </p:nvSpPr>
-        <p:spPr>
-          <a:xfrm>
-            <a:off x="1936500" y="3753725"/>
-            <a:ext cx="88800" cy="64500"/>
-          </a:xfrm>
-          <a:prstGeom prst="ellipse">
-            <a:avLst/>
-          </a:prstGeom>
-          <a:solidFill>
-            <a:schemeClr val="accent3"/>
-          </a:solidFill>
-          <a:ln w="9525" cap="flat" cmpd="sng">
-            <a:solidFill>
-              <a:schemeClr val="dk2"/>
-            </a:solidFill>
-            <a:prstDash val="solid"/>
-            <a:round/>
-            <a:headEnd type="none" w="sm" len="sm"/>
-            <a:tailEnd type="none" w="sm" len="sm"/>
-          </a:ln>
-        </p:spPr>
-        <p:txBody>
-          <a:bodyPr spcFirstLastPara="1" wrap="square" lIns="91425" tIns="91425" rIns="91425" bIns="91425" anchor="ctr" anchorCtr="0">
-            <a:noAutofit/>
-          </a:bodyPr>
-          <a:lstStyle/>
-          <a:p>
-            <a:pPr marL="0" lvl="0" indent="0" algn="l" rtl="0">
-              <a:spcBef>
-                <a:spcPts val="0"/>
-              </a:spcBef>
-              <a:spcAft>
-                <a:spcPts val="0"/>
-              </a:spcAft>
-              <a:buNone/>
-            </a:pPr>
-            <a:endParaRPr/>
-          </a:p>
-        </p:txBody>
-      </p:sp>
-      <p:sp>
-        <p:nvSpPr>
-          <p:cNvPr id="128" name="Google Shape;128;p17"/>
-          <p:cNvSpPr/>
-          <p:nvPr/>
-        </p:nvSpPr>
-        <p:spPr>
-          <a:xfrm>
-            <a:off x="2241300" y="3448925"/>
-            <a:ext cx="88800" cy="64500"/>
-          </a:xfrm>
-          <a:prstGeom prst="ellipse">
-            <a:avLst/>
-          </a:prstGeom>
-          <a:solidFill>
-            <a:schemeClr val="accent3"/>
-          </a:solidFill>
-          <a:ln w="9525" cap="flat" cmpd="sng">
-            <a:solidFill>
-              <a:schemeClr val="dk2"/>
-            </a:solidFill>
-            <a:prstDash val="solid"/>
-            <a:round/>
-            <a:headEnd type="none" w="sm" len="sm"/>
-            <a:tailEnd type="none" w="sm" len="sm"/>
-          </a:ln>
-        </p:spPr>
-        <p:txBody>
-          <a:bodyPr spcFirstLastPara="1" wrap="square" lIns="91425" tIns="91425" rIns="91425" bIns="91425" anchor="ctr" anchorCtr="0">
-            <a:noAutofit/>
-          </a:bodyPr>
-          <a:lstStyle/>
-          <a:p>
-            <a:pPr marL="0" lvl="0" indent="0" algn="l" rtl="0">
-              <a:spcBef>
-                <a:spcPts val="0"/>
-              </a:spcBef>
-              <a:spcAft>
-                <a:spcPts val="0"/>
-              </a:spcAft>
-              <a:buNone/>
-            </a:pPr>
-            <a:endParaRPr/>
-          </a:p>
-        </p:txBody>
-      </p:sp>
-      <p:sp>
-        <p:nvSpPr>
-          <p:cNvPr id="129" name="Google Shape;129;p17"/>
-          <p:cNvSpPr/>
-          <p:nvPr/>
-        </p:nvSpPr>
-        <p:spPr>
-          <a:xfrm>
-            <a:off x="2546100" y="3220325"/>
-            <a:ext cx="88800" cy="64500"/>
-          </a:xfrm>
-          <a:prstGeom prst="ellipse">
-            <a:avLst/>
-          </a:prstGeom>
-          <a:solidFill>
-            <a:schemeClr val="accent3"/>
-          </a:solidFill>
-          <a:ln w="9525" cap="flat" cmpd="sng">
-            <a:solidFill>
-              <a:schemeClr val="dk2"/>
-            </a:solidFill>
-            <a:prstDash val="solid"/>
-            <a:round/>
-            <a:headEnd type="none" w="sm" len="sm"/>
-            <a:tailEnd type="none" w="sm" len="sm"/>
-          </a:ln>
-        </p:spPr>
-        <p:txBody>
-          <a:bodyPr spcFirstLastPara="1" wrap="square" lIns="91425" tIns="91425" rIns="91425" bIns="91425" anchor="ctr" anchorCtr="0">
-            <a:noAutofit/>
-          </a:bodyPr>
-          <a:lstStyle/>
-          <a:p>
-            <a:pPr marL="0" lvl="0" indent="0" algn="l" rtl="0">
-              <a:spcBef>
-                <a:spcPts val="0"/>
-              </a:spcBef>
-              <a:spcAft>
-                <a:spcPts val="0"/>
-              </a:spcAft>
-              <a:buNone/>
-            </a:pPr>
-            <a:endParaRPr/>
-          </a:p>
-        </p:txBody>
-      </p:sp>
-      <p:sp>
-        <p:nvSpPr>
-          <p:cNvPr id="130" name="Google Shape;130;p17"/>
-          <p:cNvSpPr/>
-          <p:nvPr/>
-        </p:nvSpPr>
-        <p:spPr>
-          <a:xfrm>
-            <a:off x="2850900" y="2839325"/>
-            <a:ext cx="88800" cy="64500"/>
-          </a:xfrm>
-          <a:prstGeom prst="ellipse">
-            <a:avLst/>
-          </a:prstGeom>
-          <a:solidFill>
-            <a:srgbClr val="38761D"/>
-          </a:solidFill>
-          <a:ln w="9525" cap="flat" cmpd="sng">
-            <a:solidFill>
-              <a:schemeClr val="dk2"/>
-            </a:solidFill>
-            <a:prstDash val="solid"/>
-            <a:round/>
-            <a:headEnd type="none" w="sm" len="sm"/>
-            <a:tailEnd type="none" w="sm" len="sm"/>
-          </a:ln>
-        </p:spPr>
-        <p:txBody>
-          <a:bodyPr spcFirstLastPara="1" wrap="square" lIns="91425" tIns="91425" rIns="91425" bIns="91425" anchor="ctr" anchorCtr="0">
-            <a:noAutofit/>
-          </a:bodyPr>
-          <a:lstStyle/>
-          <a:p>
-            <a:pPr marL="0" lvl="0" indent="0" algn="l" rtl="0">
-              <a:spcBef>
-                <a:spcPts val="0"/>
-              </a:spcBef>
-              <a:spcAft>
-                <a:spcPts val="0"/>
-              </a:spcAft>
-              <a:buNone/>
-            </a:pPr>
-            <a:endParaRPr/>
-          </a:p>
-        </p:txBody>
-      </p:sp>
-      <p:sp>
-        <p:nvSpPr>
-          <p:cNvPr id="131" name="Google Shape;131;p17"/>
-          <p:cNvSpPr/>
-          <p:nvPr/>
-        </p:nvSpPr>
-        <p:spPr>
-          <a:xfrm>
-            <a:off x="3155700" y="2305925"/>
-            <a:ext cx="88800" cy="64500"/>
-          </a:xfrm>
-          <a:prstGeom prst="ellipse">
-            <a:avLst/>
-          </a:prstGeom>
-          <a:solidFill>
-            <a:srgbClr val="38761D"/>
-          </a:solidFill>
-          <a:ln w="9525" cap="flat" cmpd="sng">
-            <a:solidFill>
-              <a:schemeClr val="dk2"/>
-            </a:solidFill>
-            <a:prstDash val="solid"/>
-            <a:round/>
-            <a:headEnd type="none" w="sm" len="sm"/>
-            <a:tailEnd type="none" w="sm" len="sm"/>
-          </a:ln>
-        </p:spPr>
-        <p:txBody>
-          <a:bodyPr spcFirstLastPara="1" wrap="square" lIns="91425" tIns="91425" rIns="91425" bIns="91425" anchor="ctr" anchorCtr="0">
-            <a:noAutofit/>
-          </a:bodyPr>
-          <a:lstStyle/>
-          <a:p>
-            <a:pPr marL="0" lvl="0" indent="0" algn="l" rtl="0">
-              <a:spcBef>
-                <a:spcPts val="0"/>
-              </a:spcBef>
-              <a:spcAft>
-                <a:spcPts val="0"/>
-              </a:spcAft>
-              <a:buNone/>
-            </a:pPr>
-            <a:endParaRPr/>
-          </a:p>
-        </p:txBody>
-      </p:sp>
-      <p:sp>
-        <p:nvSpPr>
-          <p:cNvPr id="132" name="Google Shape;132;p17"/>
-          <p:cNvSpPr/>
-          <p:nvPr/>
-        </p:nvSpPr>
-        <p:spPr>
-          <a:xfrm>
-            <a:off x="3460500" y="1848725"/>
-            <a:ext cx="88800" cy="64500"/>
-          </a:xfrm>
-          <a:prstGeom prst="ellipse">
-            <a:avLst/>
-          </a:prstGeom>
-          <a:solidFill>
-            <a:srgbClr val="38761D"/>
-          </a:solidFill>
-          <a:ln w="9525" cap="flat" cmpd="sng">
-            <a:solidFill>
-              <a:schemeClr val="dk2"/>
-            </a:solidFill>
-            <a:prstDash val="solid"/>
-            <a:round/>
-            <a:headEnd type="none" w="sm" len="sm"/>
-            <a:tailEnd type="none" w="sm" len="sm"/>
-          </a:ln>
-        </p:spPr>
-        <p:txBody>
-          <a:bodyPr spcFirstLastPara="1" wrap="square" lIns="91425" tIns="91425" rIns="91425" bIns="91425" anchor="ctr" anchorCtr="0">
-            <a:noAutofit/>
-          </a:bodyPr>
-          <a:lstStyle/>
-          <a:p>
-            <a:pPr marL="0" lvl="0" indent="0" algn="l" rtl="0">
-              <a:spcBef>
-                <a:spcPts val="0"/>
-              </a:spcBef>
-              <a:spcAft>
-                <a:spcPts val="0"/>
-              </a:spcAft>
-              <a:buNone/>
-            </a:pPr>
-            <a:endParaRPr/>
-          </a:p>
-        </p:txBody>
-      </p:sp>
     </p:spTree>
     <p:extLst>
       <p:ext uri="{BB962C8B-B14F-4D97-AF65-F5344CB8AC3E}">
@@ -12351,92 +12269,12 @@
       </p:sp>
       <p:pic>
         <p:nvPicPr>
-          <p:cNvPr id="153" name="Google Shape;153;p20"/>
+          <p:cNvPr id="156" name="Google Shape;156;p20"/>
           <p:cNvPicPr preferRelativeResize="0"/>
           <p:nvPr/>
         </p:nvPicPr>
         <p:blipFill>
           <a:blip r:embed="rId3">
-            <a:alphaModFix/>
-          </a:blip>
-          <a:stretch>
-            <a:fillRect/>
-          </a:stretch>
-        </p:blipFill>
-        <p:spPr>
-          <a:xfrm>
-            <a:off x="176625" y="1173225"/>
-            <a:ext cx="4225126" cy="3075675"/>
-          </a:xfrm>
-          <a:prstGeom prst="rect">
-            <a:avLst/>
-          </a:prstGeom>
-          <a:noFill/>
-          <a:ln>
-            <a:noFill/>
-          </a:ln>
-        </p:spPr>
-      </p:pic>
-      <p:cxnSp>
-        <p:nvCxnSpPr>
-          <p:cNvPr id="154" name="Google Shape;154;p20"/>
-          <p:cNvCxnSpPr/>
-          <p:nvPr/>
-        </p:nvCxnSpPr>
-        <p:spPr>
-          <a:xfrm>
-            <a:off x="754900" y="1479600"/>
-            <a:ext cx="3371100" cy="0"/>
-          </a:xfrm>
-          <a:prstGeom prst="straightConnector1">
-            <a:avLst/>
-          </a:prstGeom>
-          <a:noFill/>
-          <a:ln w="38100" cap="flat" cmpd="sng">
-            <a:solidFill>
-              <a:srgbClr val="0000FF"/>
-            </a:solidFill>
-            <a:prstDash val="solid"/>
-            <a:round/>
-            <a:headEnd type="none" w="med" len="med"/>
-            <a:tailEnd type="none" w="med" len="med"/>
-          </a:ln>
-        </p:spPr>
-      </p:cxnSp>
-      <p:cxnSp>
-        <p:nvCxnSpPr>
-          <p:cNvPr id="155" name="Google Shape;155;p20"/>
-          <p:cNvCxnSpPr/>
-          <p:nvPr/>
-        </p:nvCxnSpPr>
-        <p:spPr>
-          <a:xfrm>
-            <a:off x="754900" y="1555800"/>
-            <a:ext cx="1896900" cy="9000"/>
-          </a:xfrm>
-          <a:prstGeom prst="straightConnector1">
-            <a:avLst/>
-          </a:prstGeom>
-          <a:noFill/>
-          <a:ln w="38100" cap="flat" cmpd="sng">
-            <a:solidFill>
-              <a:srgbClr val="F6B26B"/>
-            </a:solidFill>
-            <a:prstDash val="solid"/>
-            <a:round/>
-            <a:headEnd type="none" w="med" len="med"/>
-            <a:tailEnd type="none" w="med" len="med"/>
-          </a:ln>
-        </p:spPr>
-      </p:cxnSp>
-      <p:pic>
-        <p:nvPicPr>
-          <p:cNvPr id="156" name="Google Shape;156;p20"/>
-          <p:cNvPicPr preferRelativeResize="0"/>
-          <p:nvPr/>
-        </p:nvPicPr>
-        <p:blipFill>
-          <a:blip r:embed="rId4">
             <a:alphaModFix/>
           </a:blip>
           <a:stretch>
@@ -12455,6 +12293,36 @@
           <a:ln>
             <a:noFill/>
           </a:ln>
+        </p:spPr>
+      </p:pic>
+      <p:pic>
+        <p:nvPicPr>
+          <p:cNvPr id="2" name="Picture 1">
+            <a:extLst>
+              <a:ext uri="{FF2B5EF4-FFF2-40B4-BE49-F238E27FC236}">
+                <a16:creationId xmlns:a16="http://schemas.microsoft.com/office/drawing/2014/main" id="{63E774B9-7659-C045-AE6F-6F1DB209FE69}"/>
+              </a:ext>
+            </a:extLst>
+          </p:cNvPr>
+          <p:cNvPicPr>
+            <a:picLocks noChangeAspect="1"/>
+          </p:cNvPicPr>
+          <p:nvPr/>
+        </p:nvPicPr>
+        <p:blipFill>
+          <a:blip r:embed="rId4"/>
+          <a:stretch>
+            <a:fillRect/>
+          </a:stretch>
+        </p:blipFill>
+        <p:spPr>
+          <a:xfrm>
+            <a:off x="0" y="1203575"/>
+            <a:ext cx="4762831" cy="3604775"/>
+          </a:xfrm>
+          <a:prstGeom prst="rect">
+            <a:avLst/>
+          </a:prstGeom>
         </p:spPr>
       </p:pic>
     </p:spTree>

</xml_diff>

<commit_message>
adding  more chart for EDA
</commit_message>
<xml_diff>
--- a/Project 2 _ Ames Housing Data and Kaggle Challenge.pptx
+++ b/Project 2 _ Ames Housing Data and Kaggle Challenge.pptx
@@ -5,7 +5,7 @@
     <p:sldMasterId id="2147483659" r:id="rId1"/>
   </p:sldMasterIdLst>
   <p:notesMasterIdLst>
-    <p:notesMasterId r:id="rId15"/>
+    <p:notesMasterId r:id="rId16"/>
   </p:notesMasterIdLst>
   <p:sldIdLst>
     <p:sldId id="256" r:id="rId2"/>
@@ -13,29 +13,30 @@
     <p:sldId id="258" r:id="rId4"/>
     <p:sldId id="259" r:id="rId5"/>
     <p:sldId id="268" r:id="rId6"/>
-    <p:sldId id="260" r:id="rId7"/>
-    <p:sldId id="261" r:id="rId8"/>
-    <p:sldId id="262" r:id="rId9"/>
-    <p:sldId id="263" r:id="rId10"/>
-    <p:sldId id="264" r:id="rId11"/>
-    <p:sldId id="265" r:id="rId12"/>
-    <p:sldId id="266" r:id="rId13"/>
-    <p:sldId id="267" r:id="rId14"/>
+    <p:sldId id="269" r:id="rId7"/>
+    <p:sldId id="260" r:id="rId8"/>
+    <p:sldId id="261" r:id="rId9"/>
+    <p:sldId id="262" r:id="rId10"/>
+    <p:sldId id="263" r:id="rId11"/>
+    <p:sldId id="264" r:id="rId12"/>
+    <p:sldId id="265" r:id="rId13"/>
+    <p:sldId id="266" r:id="rId14"/>
+    <p:sldId id="267" r:id="rId15"/>
   </p:sldIdLst>
   <p:sldSz cx="9144000" cy="5143500" type="screen16x9"/>
   <p:notesSz cx="6858000" cy="9144000"/>
   <p:embeddedFontLst>
     <p:embeddedFont>
       <p:font typeface="Oswald" pitchFamily="2" charset="77"/>
-      <p:regular r:id="rId16"/>
-      <p:bold r:id="rId17"/>
+      <p:regular r:id="rId17"/>
+      <p:bold r:id="rId18"/>
     </p:embeddedFont>
     <p:embeddedFont>
       <p:font typeface="Roboto" panose="02000000000000000000" pitchFamily="2" charset="0"/>
-      <p:regular r:id="rId18"/>
-      <p:bold r:id="rId19"/>
-      <p:italic r:id="rId20"/>
-      <p:boldItalic r:id="rId21"/>
+      <p:regular r:id="rId19"/>
+      <p:bold r:id="rId20"/>
+      <p:italic r:id="rId21"/>
+      <p:boldItalic r:id="rId22"/>
     </p:embeddedFont>
   </p:embeddedFontLst>
   <p:defaultTextStyle>
@@ -836,6 +837,110 @@
   <p:cSld>
     <p:spTree>
       <p:nvGrpSpPr>
+        <p:cNvPr id="1" name="Shape 147"/>
+        <p:cNvGrpSpPr/>
+        <p:nvPr/>
+      </p:nvGrpSpPr>
+      <p:grpSpPr>
+        <a:xfrm>
+          <a:off x="0" y="0"/>
+          <a:ext cx="0" cy="0"/>
+          <a:chOff x="0" y="0"/>
+          <a:chExt cx="0" cy="0"/>
+        </a:xfrm>
+      </p:grpSpPr>
+      <p:sp>
+        <p:nvSpPr>
+          <p:cNvPr id="148" name="Google Shape;148;g111189ca00a_0_17:notes"/>
+          <p:cNvSpPr>
+            <a:spLocks noGrp="1" noRot="1" noChangeAspect="1"/>
+          </p:cNvSpPr>
+          <p:nvPr>
+            <p:ph type="sldImg" idx="2"/>
+          </p:nvPr>
+        </p:nvSpPr>
+        <p:spPr>
+          <a:xfrm>
+            <a:off x="381000" y="685800"/>
+            <a:ext cx="6096000" cy="3429000"/>
+          </a:xfrm>
+          <a:custGeom>
+            <a:avLst/>
+            <a:gdLst/>
+            <a:ahLst/>
+            <a:cxnLst/>
+            <a:rect l="l" t="t" r="r" b="b"/>
+            <a:pathLst>
+              <a:path w="120000" h="120000" extrusionOk="0">
+                <a:moveTo>
+                  <a:pt x="0" y="0"/>
+                </a:moveTo>
+                <a:lnTo>
+                  <a:pt x="120000" y="0"/>
+                </a:lnTo>
+                <a:lnTo>
+                  <a:pt x="120000" y="120000"/>
+                </a:lnTo>
+                <a:lnTo>
+                  <a:pt x="0" y="120000"/>
+                </a:lnTo>
+                <a:close/>
+              </a:path>
+            </a:pathLst>
+          </a:custGeom>
+        </p:spPr>
+      </p:sp>
+      <p:sp>
+        <p:nvSpPr>
+          <p:cNvPr id="149" name="Google Shape;149;g111189ca00a_0_17:notes"/>
+          <p:cNvSpPr txBox="1">
+            <a:spLocks noGrp="1"/>
+          </p:cNvSpPr>
+          <p:nvPr>
+            <p:ph type="body" idx="1"/>
+          </p:nvPr>
+        </p:nvSpPr>
+        <p:spPr>
+          <a:xfrm>
+            <a:off x="685800" y="4343400"/>
+            <a:ext cx="5486400" cy="4114800"/>
+          </a:xfrm>
+          <a:prstGeom prst="rect">
+            <a:avLst/>
+          </a:prstGeom>
+        </p:spPr>
+        <p:txBody>
+          <a:bodyPr spcFirstLastPara="1" wrap="square" lIns="91425" tIns="91425" rIns="91425" bIns="91425" anchor="t" anchorCtr="0">
+            <a:noAutofit/>
+          </a:bodyPr>
+          <a:lstStyle/>
+          <a:p>
+            <a:pPr marL="0" lvl="0" indent="0" algn="l" rtl="0">
+              <a:spcBef>
+                <a:spcPts val="0"/>
+              </a:spcBef>
+              <a:spcAft>
+                <a:spcPts val="0"/>
+              </a:spcAft>
+              <a:buNone/>
+            </a:pPr>
+            <a:endParaRPr/>
+          </a:p>
+        </p:txBody>
+      </p:sp>
+    </p:spTree>
+  </p:cSld>
+  <p:clrMapOvr>
+    <a:masterClrMapping/>
+  </p:clrMapOvr>
+</p:notes>
+</file>
+
+<file path=ppt/notesSlides/notesSlide11.xml><?xml version="1.0" encoding="utf-8"?>
+<p:notes xmlns:a="http://schemas.openxmlformats.org/drawingml/2006/main" xmlns:r="http://schemas.openxmlformats.org/officeDocument/2006/relationships" xmlns:p="http://schemas.openxmlformats.org/presentationml/2006/main" showMasterSp="0" showMasterPhAnim="0">
+  <p:cSld>
+    <p:spTree>
+      <p:nvGrpSpPr>
         <p:cNvPr id="1" name="Shape 157"/>
         <p:cNvGrpSpPr/>
         <p:nvPr/>
@@ -935,7 +1040,7 @@
 </p:notes>
 </file>
 
-<file path=ppt/notesSlides/notesSlide11.xml><?xml version="1.0" encoding="utf-8"?>
+<file path=ppt/notesSlides/notesSlide12.xml><?xml version="1.0" encoding="utf-8"?>
 <p:notes xmlns:a="http://schemas.openxmlformats.org/drawingml/2006/main" xmlns:r="http://schemas.openxmlformats.org/officeDocument/2006/relationships" xmlns:p="http://schemas.openxmlformats.org/presentationml/2006/main" showMasterSp="0" showMasterPhAnim="0">
   <p:cSld>
     <p:spTree>
@@ -1039,7 +1144,7 @@
 </p:notes>
 </file>
 
-<file path=ppt/notesSlides/notesSlide12.xml><?xml version="1.0" encoding="utf-8"?>
+<file path=ppt/notesSlides/notesSlide13.xml><?xml version="1.0" encoding="utf-8"?>
 <p:notes xmlns:a="http://schemas.openxmlformats.org/drawingml/2006/main" xmlns:r="http://schemas.openxmlformats.org/officeDocument/2006/relationships" xmlns:p="http://schemas.openxmlformats.org/presentationml/2006/main" showMasterSp="0" showMasterPhAnim="0">
   <p:cSld>
     <p:spTree>
@@ -1143,7 +1248,7 @@
 </p:notes>
 </file>
 
-<file path=ppt/notesSlides/notesSlide13.xml><?xml version="1.0" encoding="utf-8"?>
+<file path=ppt/notesSlides/notesSlide14.xml><?xml version="1.0" encoding="utf-8"?>
 <p:notes xmlns:a="http://schemas.openxmlformats.org/drawingml/2006/main" xmlns:r="http://schemas.openxmlformats.org/officeDocument/2006/relationships" xmlns:p="http://schemas.openxmlformats.org/presentationml/2006/main" showMasterSp="0" showMasterPhAnim="0">
   <p:cSld>
     <p:spTree>
@@ -1765,6 +1870,11 @@
         </p:txBody>
       </p:sp>
     </p:spTree>
+    <p:extLst>
+      <p:ext uri="{BB962C8B-B14F-4D97-AF65-F5344CB8AC3E}">
+        <p14:creationId xmlns:p14="http://schemas.microsoft.com/office/powerpoint/2010/main" val="2339638619"/>
+      </p:ext>
+    </p:extLst>
   </p:cSld>
   <p:clrMapOvr>
     <a:masterClrMapping/>
@@ -1773,6 +1883,110 @@
 </file>
 
 <file path=ppt/notesSlides/notesSlide7.xml><?xml version="1.0" encoding="utf-8"?>
+<p:notes xmlns:a="http://schemas.openxmlformats.org/drawingml/2006/main" xmlns:r="http://schemas.openxmlformats.org/officeDocument/2006/relationships" xmlns:p="http://schemas.openxmlformats.org/presentationml/2006/main" showMasterSp="0" showMasterPhAnim="0">
+  <p:cSld>
+    <p:spTree>
+      <p:nvGrpSpPr>
+        <p:cNvPr id="1" name="Shape 119"/>
+        <p:cNvGrpSpPr/>
+        <p:nvPr/>
+      </p:nvGrpSpPr>
+      <p:grpSpPr>
+        <a:xfrm>
+          <a:off x="0" y="0"/>
+          <a:ext cx="0" cy="0"/>
+          <a:chOff x="0" y="0"/>
+          <a:chExt cx="0" cy="0"/>
+        </a:xfrm>
+      </p:grpSpPr>
+      <p:sp>
+        <p:nvSpPr>
+          <p:cNvPr id="120" name="Google Shape;120;gc6f9e470d_0_24:notes"/>
+          <p:cNvSpPr>
+            <a:spLocks noGrp="1" noRot="1" noChangeAspect="1"/>
+          </p:cNvSpPr>
+          <p:nvPr>
+            <p:ph type="sldImg" idx="2"/>
+          </p:nvPr>
+        </p:nvSpPr>
+        <p:spPr>
+          <a:xfrm>
+            <a:off x="381000" y="685800"/>
+            <a:ext cx="6096000" cy="3429000"/>
+          </a:xfrm>
+          <a:custGeom>
+            <a:avLst/>
+            <a:gdLst/>
+            <a:ahLst/>
+            <a:cxnLst/>
+            <a:rect l="l" t="t" r="r" b="b"/>
+            <a:pathLst>
+              <a:path w="120000" h="120000" extrusionOk="0">
+                <a:moveTo>
+                  <a:pt x="0" y="0"/>
+                </a:moveTo>
+                <a:lnTo>
+                  <a:pt x="120000" y="0"/>
+                </a:lnTo>
+                <a:lnTo>
+                  <a:pt x="120000" y="120000"/>
+                </a:lnTo>
+                <a:lnTo>
+                  <a:pt x="0" y="120000"/>
+                </a:lnTo>
+                <a:close/>
+              </a:path>
+            </a:pathLst>
+          </a:custGeom>
+        </p:spPr>
+      </p:sp>
+      <p:sp>
+        <p:nvSpPr>
+          <p:cNvPr id="121" name="Google Shape;121;gc6f9e470d_0_24:notes"/>
+          <p:cNvSpPr txBox="1">
+            <a:spLocks noGrp="1"/>
+          </p:cNvSpPr>
+          <p:nvPr>
+            <p:ph type="body" idx="1"/>
+          </p:nvPr>
+        </p:nvSpPr>
+        <p:spPr>
+          <a:xfrm>
+            <a:off x="685800" y="4343400"/>
+            <a:ext cx="5486400" cy="4114800"/>
+          </a:xfrm>
+          <a:prstGeom prst="rect">
+            <a:avLst/>
+          </a:prstGeom>
+        </p:spPr>
+        <p:txBody>
+          <a:bodyPr spcFirstLastPara="1" wrap="square" lIns="91425" tIns="91425" rIns="91425" bIns="91425" anchor="t" anchorCtr="0">
+            <a:noAutofit/>
+          </a:bodyPr>
+          <a:lstStyle/>
+          <a:p>
+            <a:pPr marL="0" lvl="0" indent="0" algn="l" rtl="0">
+              <a:spcBef>
+                <a:spcPts val="0"/>
+              </a:spcBef>
+              <a:spcAft>
+                <a:spcPts val="0"/>
+              </a:spcAft>
+              <a:buNone/>
+            </a:pPr>
+            <a:endParaRPr/>
+          </a:p>
+        </p:txBody>
+      </p:sp>
+    </p:spTree>
+  </p:cSld>
+  <p:clrMapOvr>
+    <a:masterClrMapping/>
+  </p:clrMapOvr>
+</p:notes>
+</file>
+
+<file path=ppt/notesSlides/notesSlide8.xml><?xml version="1.0" encoding="utf-8"?>
 <p:notes xmlns:a="http://schemas.openxmlformats.org/drawingml/2006/main" xmlns:r="http://schemas.openxmlformats.org/officeDocument/2006/relationships" xmlns:p="http://schemas.openxmlformats.org/presentationml/2006/main" showMasterSp="0" showMasterPhAnim="0">
   <p:cSld>
     <p:spTree>
@@ -1876,7 +2090,7 @@
 </p:notes>
 </file>
 
-<file path=ppt/notesSlides/notesSlide8.xml><?xml version="1.0" encoding="utf-8"?>
+<file path=ppt/notesSlides/notesSlide9.xml><?xml version="1.0" encoding="utf-8"?>
 <p:notes xmlns:a="http://schemas.openxmlformats.org/drawingml/2006/main" xmlns:r="http://schemas.openxmlformats.org/officeDocument/2006/relationships" xmlns:p="http://schemas.openxmlformats.org/presentationml/2006/main" showMasterSp="0" showMasterPhAnim="0">
   <p:cSld>
     <p:spTree>
@@ -1937,110 +2151,6 @@
       <p:sp>
         <p:nvSpPr>
           <p:cNvPr id="142" name="Google Shape;142;g111189ca00a_0_45:notes"/>
-          <p:cNvSpPr txBox="1">
-            <a:spLocks noGrp="1"/>
-          </p:cNvSpPr>
-          <p:nvPr>
-            <p:ph type="body" idx="1"/>
-          </p:nvPr>
-        </p:nvSpPr>
-        <p:spPr>
-          <a:xfrm>
-            <a:off x="685800" y="4343400"/>
-            <a:ext cx="5486400" cy="4114800"/>
-          </a:xfrm>
-          <a:prstGeom prst="rect">
-            <a:avLst/>
-          </a:prstGeom>
-        </p:spPr>
-        <p:txBody>
-          <a:bodyPr spcFirstLastPara="1" wrap="square" lIns="91425" tIns="91425" rIns="91425" bIns="91425" anchor="t" anchorCtr="0">
-            <a:noAutofit/>
-          </a:bodyPr>
-          <a:lstStyle/>
-          <a:p>
-            <a:pPr marL="0" lvl="0" indent="0" algn="l" rtl="0">
-              <a:spcBef>
-                <a:spcPts val="0"/>
-              </a:spcBef>
-              <a:spcAft>
-                <a:spcPts val="0"/>
-              </a:spcAft>
-              <a:buNone/>
-            </a:pPr>
-            <a:endParaRPr/>
-          </a:p>
-        </p:txBody>
-      </p:sp>
-    </p:spTree>
-  </p:cSld>
-  <p:clrMapOvr>
-    <a:masterClrMapping/>
-  </p:clrMapOvr>
-</p:notes>
-</file>
-
-<file path=ppt/notesSlides/notesSlide9.xml><?xml version="1.0" encoding="utf-8"?>
-<p:notes xmlns:a="http://schemas.openxmlformats.org/drawingml/2006/main" xmlns:r="http://schemas.openxmlformats.org/officeDocument/2006/relationships" xmlns:p="http://schemas.openxmlformats.org/presentationml/2006/main" showMasterSp="0" showMasterPhAnim="0">
-  <p:cSld>
-    <p:spTree>
-      <p:nvGrpSpPr>
-        <p:cNvPr id="1" name="Shape 147"/>
-        <p:cNvGrpSpPr/>
-        <p:nvPr/>
-      </p:nvGrpSpPr>
-      <p:grpSpPr>
-        <a:xfrm>
-          <a:off x="0" y="0"/>
-          <a:ext cx="0" cy="0"/>
-          <a:chOff x="0" y="0"/>
-          <a:chExt cx="0" cy="0"/>
-        </a:xfrm>
-      </p:grpSpPr>
-      <p:sp>
-        <p:nvSpPr>
-          <p:cNvPr id="148" name="Google Shape;148;g111189ca00a_0_17:notes"/>
-          <p:cNvSpPr>
-            <a:spLocks noGrp="1" noRot="1" noChangeAspect="1"/>
-          </p:cNvSpPr>
-          <p:nvPr>
-            <p:ph type="sldImg" idx="2"/>
-          </p:nvPr>
-        </p:nvSpPr>
-        <p:spPr>
-          <a:xfrm>
-            <a:off x="381000" y="685800"/>
-            <a:ext cx="6096000" cy="3429000"/>
-          </a:xfrm>
-          <a:custGeom>
-            <a:avLst/>
-            <a:gdLst/>
-            <a:ahLst/>
-            <a:cxnLst/>
-            <a:rect l="l" t="t" r="r" b="b"/>
-            <a:pathLst>
-              <a:path w="120000" h="120000" extrusionOk="0">
-                <a:moveTo>
-                  <a:pt x="0" y="0"/>
-                </a:moveTo>
-                <a:lnTo>
-                  <a:pt x="120000" y="0"/>
-                </a:lnTo>
-                <a:lnTo>
-                  <a:pt x="120000" y="120000"/>
-                </a:lnTo>
-                <a:lnTo>
-                  <a:pt x="0" y="120000"/>
-                </a:lnTo>
-                <a:close/>
-              </a:path>
-            </a:pathLst>
-          </a:custGeom>
-        </p:spPr>
-      </p:sp>
-      <p:sp>
-        <p:nvSpPr>
-          <p:cNvPr id="149" name="Google Shape;149;g111189ca00a_0_17:notes"/>
           <p:cNvSpPr txBox="1">
             <a:spLocks noGrp="1"/>
           </p:cNvSpPr>
@@ -8877,6 +8987,217 @@
   <p:cSld>
     <p:spTree>
       <p:nvGrpSpPr>
+        <p:cNvPr id="1" name="Shape 150"/>
+        <p:cNvGrpSpPr/>
+        <p:nvPr/>
+      </p:nvGrpSpPr>
+      <p:grpSpPr>
+        <a:xfrm>
+          <a:off x="0" y="0"/>
+          <a:ext cx="0" cy="0"/>
+          <a:chOff x="0" y="0"/>
+          <a:chExt cx="0" cy="0"/>
+        </a:xfrm>
+      </p:grpSpPr>
+      <p:sp>
+        <p:nvSpPr>
+          <p:cNvPr id="151" name="Google Shape;151;p20"/>
+          <p:cNvSpPr txBox="1">
+            <a:spLocks noGrp="1"/>
+          </p:cNvSpPr>
+          <p:nvPr>
+            <p:ph type="title"/>
+          </p:nvPr>
+        </p:nvSpPr>
+        <p:spPr>
+          <a:xfrm>
+            <a:off x="311700" y="595775"/>
+            <a:ext cx="8520600" cy="607800"/>
+          </a:xfrm>
+          <a:prstGeom prst="rect">
+            <a:avLst/>
+          </a:prstGeom>
+        </p:spPr>
+        <p:txBody>
+          <a:bodyPr spcFirstLastPara="1" wrap="square" lIns="91425" tIns="91425" rIns="91425" bIns="91425" anchor="t" anchorCtr="0">
+            <a:normAutofit fontScale="90000"/>
+          </a:bodyPr>
+          <a:lstStyle/>
+          <a:p>
+            <a:pPr marL="0" lvl="0" indent="0" algn="l" rtl="0">
+              <a:spcBef>
+                <a:spcPts val="0"/>
+              </a:spcBef>
+              <a:spcAft>
+                <a:spcPts val="0"/>
+              </a:spcAft>
+              <a:buNone/>
+            </a:pPr>
+            <a:r>
+              <a:rPr lang="en"/>
+              <a:t>The Neighborhood..</a:t>
+            </a:r>
+            <a:endParaRPr/>
+          </a:p>
+        </p:txBody>
+      </p:sp>
+      <p:sp>
+        <p:nvSpPr>
+          <p:cNvPr id="152" name="Google Shape;152;p20"/>
+          <p:cNvSpPr txBox="1">
+            <a:spLocks noGrp="1"/>
+          </p:cNvSpPr>
+          <p:nvPr>
+            <p:ph type="body" idx="4294967295"/>
+          </p:nvPr>
+        </p:nvSpPr>
+        <p:spPr>
+          <a:xfrm>
+            <a:off x="4634200" y="159600"/>
+            <a:ext cx="4113900" cy="1342800"/>
+          </a:xfrm>
+          <a:prstGeom prst="rect">
+            <a:avLst/>
+          </a:prstGeom>
+        </p:spPr>
+        <p:txBody>
+          <a:bodyPr spcFirstLastPara="1" wrap="square" lIns="91425" tIns="91425" rIns="91425" bIns="91425" anchor="t" anchorCtr="0">
+            <a:normAutofit lnSpcReduction="10000"/>
+          </a:bodyPr>
+          <a:lstStyle/>
+          <a:p>
+            <a:pPr marL="0" lvl="0" indent="0" algn="l" rtl="0">
+              <a:spcBef>
+                <a:spcPts val="0"/>
+              </a:spcBef>
+              <a:spcAft>
+                <a:spcPts val="800"/>
+              </a:spcAft>
+              <a:buNone/>
+            </a:pPr>
+            <a:r>
+              <a:rPr lang="en" sz="1600" b="1">
+                <a:solidFill>
+                  <a:schemeClr val="dk1"/>
+                </a:solidFill>
+              </a:rPr>
+              <a:t>NAmes</a:t>
+            </a:r>
+            <a:r>
+              <a:rPr lang="en" sz="1600"/>
+              <a:t> and </a:t>
+            </a:r>
+            <a:r>
+              <a:rPr lang="en" sz="1600" b="1">
+                <a:solidFill>
+                  <a:srgbClr val="E69138"/>
+                </a:solidFill>
+              </a:rPr>
+              <a:t>CollgCr</a:t>
+            </a:r>
+            <a:r>
+              <a:rPr lang="en" sz="1600"/>
+              <a:t> are top 2 neighborhoods that have most numbers of sold properties over 4 years. </a:t>
+            </a:r>
+            <a:r>
+              <a:rPr lang="en" sz="1600" b="1">
+                <a:solidFill>
+                  <a:srgbClr val="E69138"/>
+                </a:solidFill>
+              </a:rPr>
+              <a:t>CollgCr</a:t>
+            </a:r>
+            <a:r>
+              <a:rPr lang="en" sz="1600"/>
+              <a:t> has  better quality rating than </a:t>
+            </a:r>
+            <a:r>
+              <a:rPr lang="en" sz="1600" b="1">
+                <a:solidFill>
+                  <a:schemeClr val="dk1"/>
+                </a:solidFill>
+              </a:rPr>
+              <a:t>NAmes</a:t>
+            </a:r>
+            <a:r>
+              <a:rPr lang="en" sz="1600"/>
+              <a:t>.</a:t>
+            </a:r>
+            <a:endParaRPr sz="1600"/>
+          </a:p>
+        </p:txBody>
+      </p:sp>
+      <p:pic>
+        <p:nvPicPr>
+          <p:cNvPr id="156" name="Google Shape;156;p20"/>
+          <p:cNvPicPr preferRelativeResize="0"/>
+          <p:nvPr/>
+        </p:nvPicPr>
+        <p:blipFill>
+          <a:blip r:embed="rId3">
+            <a:alphaModFix/>
+          </a:blip>
+          <a:stretch>
+            <a:fillRect/>
+          </a:stretch>
+        </p:blipFill>
+        <p:spPr>
+          <a:xfrm>
+            <a:off x="4634188" y="1795525"/>
+            <a:ext cx="3950438" cy="2875725"/>
+          </a:xfrm>
+          <a:prstGeom prst="rect">
+            <a:avLst/>
+          </a:prstGeom>
+          <a:noFill/>
+          <a:ln>
+            <a:noFill/>
+          </a:ln>
+        </p:spPr>
+      </p:pic>
+      <p:pic>
+        <p:nvPicPr>
+          <p:cNvPr id="2" name="Picture 1">
+            <a:extLst>
+              <a:ext uri="{FF2B5EF4-FFF2-40B4-BE49-F238E27FC236}">
+                <a16:creationId xmlns:a16="http://schemas.microsoft.com/office/drawing/2014/main" id="{63E774B9-7659-C045-AE6F-6F1DB209FE69}"/>
+              </a:ext>
+            </a:extLst>
+          </p:cNvPr>
+          <p:cNvPicPr>
+            <a:picLocks noChangeAspect="1"/>
+          </p:cNvPicPr>
+          <p:nvPr/>
+        </p:nvPicPr>
+        <p:blipFill>
+          <a:blip r:embed="rId4"/>
+          <a:stretch>
+            <a:fillRect/>
+          </a:stretch>
+        </p:blipFill>
+        <p:spPr>
+          <a:xfrm>
+            <a:off x="0" y="1203575"/>
+            <a:ext cx="4762831" cy="3604775"/>
+          </a:xfrm>
+          <a:prstGeom prst="rect">
+            <a:avLst/>
+          </a:prstGeom>
+        </p:spPr>
+      </p:pic>
+    </p:spTree>
+  </p:cSld>
+  <p:clrMapOvr>
+    <a:masterClrMapping/>
+  </p:clrMapOvr>
+</p:sld>
+</file>
+
+<file path=ppt/slides/slide11.xml><?xml version="1.0" encoding="utf-8"?>
+<p:sld xmlns:a="http://schemas.openxmlformats.org/drawingml/2006/main" xmlns:r="http://schemas.openxmlformats.org/officeDocument/2006/relationships" xmlns:p="http://schemas.openxmlformats.org/presentationml/2006/main">
+  <p:cSld>
+    <p:spTree>
+      <p:nvGrpSpPr>
         <p:cNvPr id="1" name="Shape 160"/>
         <p:cNvGrpSpPr/>
         <p:nvPr/>
@@ -9258,7 +9579,7 @@
 </p:sld>
 </file>
 
-<file path=ppt/slides/slide11.xml><?xml version="1.0" encoding="utf-8"?>
+<file path=ppt/slides/slide12.xml><?xml version="1.0" encoding="utf-8"?>
 <p:sld xmlns:a="http://schemas.openxmlformats.org/drawingml/2006/main" xmlns:r="http://schemas.openxmlformats.org/officeDocument/2006/relationships" xmlns:p="http://schemas.openxmlformats.org/presentationml/2006/main">
   <p:cSld>
     <p:spTree>
@@ -9340,7 +9661,7 @@
 </p:sld>
 </file>
 
-<file path=ppt/slides/slide12.xml><?xml version="1.0" encoding="utf-8"?>
+<file path=ppt/slides/slide13.xml><?xml version="1.0" encoding="utf-8"?>
 <p:sld xmlns:a="http://schemas.openxmlformats.org/drawingml/2006/main" xmlns:r="http://schemas.openxmlformats.org/officeDocument/2006/relationships" xmlns:p="http://schemas.openxmlformats.org/presentationml/2006/main">
   <p:cSld>
     <p:spTree>
@@ -10094,7 +10415,7 @@
 </p:sld>
 </file>
 
-<file path=ppt/slides/slide13.xml><?xml version="1.0" encoding="utf-8"?>
+<file path=ppt/slides/slide14.xml><?xml version="1.0" encoding="utf-8"?>
 <p:sld xmlns:a="http://schemas.openxmlformats.org/drawingml/2006/main" xmlns:r="http://schemas.openxmlformats.org/officeDocument/2006/relationships" xmlns:p="http://schemas.openxmlformats.org/presentationml/2006/main">
   <p:cSld>
     <p:spTree>
@@ -11592,6 +11913,198 @@
         <p:spPr>
           <a:xfrm>
             <a:off x="311700" y="410000"/>
+            <a:ext cx="8520600" cy="607800"/>
+          </a:xfrm>
+          <a:prstGeom prst="rect">
+            <a:avLst/>
+          </a:prstGeom>
+        </p:spPr>
+        <p:txBody>
+          <a:bodyPr spcFirstLastPara="1" wrap="square" lIns="91425" tIns="91425" rIns="91425" bIns="91425" anchor="t" anchorCtr="0">
+            <a:normAutofit fontScale="90000"/>
+          </a:bodyPr>
+          <a:lstStyle/>
+          <a:p>
+            <a:pPr marL="0" lvl="0" indent="0" algn="l" rtl="0">
+              <a:spcBef>
+                <a:spcPts val="0"/>
+              </a:spcBef>
+              <a:spcAft>
+                <a:spcPts val="0"/>
+              </a:spcAft>
+              <a:buNone/>
+            </a:pPr>
+            <a:r>
+              <a:rPr lang="en"/>
+              <a:t>Overall Quality Rating</a:t>
+            </a:r>
+            <a:endParaRPr/>
+          </a:p>
+        </p:txBody>
+      </p:sp>
+      <p:sp>
+        <p:nvSpPr>
+          <p:cNvPr id="124" name="Google Shape;124;p17"/>
+          <p:cNvSpPr txBox="1">
+            <a:spLocks noGrp="1"/>
+          </p:cNvSpPr>
+          <p:nvPr>
+            <p:ph type="body" idx="4294967295"/>
+          </p:nvPr>
+        </p:nvSpPr>
+        <p:spPr>
+          <a:xfrm>
+            <a:off x="4830500" y="555400"/>
+            <a:ext cx="3619800" cy="4218600"/>
+          </a:xfrm>
+          <a:prstGeom prst="rect">
+            <a:avLst/>
+          </a:prstGeom>
+        </p:spPr>
+        <p:txBody>
+          <a:bodyPr spcFirstLastPara="1" wrap="square" lIns="91425" tIns="91425" rIns="91425" bIns="91425" anchor="t" anchorCtr="0">
+            <a:normAutofit/>
+          </a:bodyPr>
+          <a:lstStyle/>
+          <a:p>
+            <a:pPr marL="0" lvl="0" indent="0" algn="l" rtl="0">
+              <a:spcBef>
+                <a:spcPts val="0"/>
+              </a:spcBef>
+              <a:spcAft>
+                <a:spcPts val="0"/>
+              </a:spcAft>
+              <a:buNone/>
+            </a:pPr>
+            <a:endParaRPr lang="en-US" sz="1600" b="1" dirty="0"/>
+          </a:p>
+          <a:p>
+            <a:pPr marL="0" lvl="0" indent="0" algn="l" rtl="0">
+              <a:spcBef>
+                <a:spcPts val="0"/>
+              </a:spcBef>
+              <a:spcAft>
+                <a:spcPts val="0"/>
+              </a:spcAft>
+              <a:buNone/>
+            </a:pPr>
+            <a:endParaRPr lang="en-US" sz="1600" b="1" dirty="0"/>
+          </a:p>
+          <a:p>
+            <a:pPr marL="0" lvl="0" indent="0" algn="l" rtl="0">
+              <a:spcBef>
+                <a:spcPts val="0"/>
+              </a:spcBef>
+              <a:spcAft>
+                <a:spcPts val="0"/>
+              </a:spcAft>
+              <a:buNone/>
+            </a:pPr>
+            <a:endParaRPr lang="en-US" sz="1600" b="1" dirty="0"/>
+          </a:p>
+          <a:p>
+            <a:pPr marL="0" lvl="0" indent="0" algn="l" rtl="0">
+              <a:spcBef>
+                <a:spcPts val="0"/>
+              </a:spcBef>
+              <a:spcAft>
+                <a:spcPts val="0"/>
+              </a:spcAft>
+              <a:buNone/>
+            </a:pPr>
+            <a:endParaRPr lang="en-US" sz="1600" b="1" dirty="0"/>
+          </a:p>
+          <a:p>
+            <a:pPr marL="0" lvl="0" indent="0" algn="l" rtl="0">
+              <a:spcBef>
+                <a:spcPts val="0"/>
+              </a:spcBef>
+              <a:spcAft>
+                <a:spcPts val="0"/>
+              </a:spcAft>
+              <a:buNone/>
+            </a:pPr>
+            <a:r>
+              <a:rPr lang="en-US" sz="1600" b="1" dirty="0"/>
+              <a:t>Very Excellent has more than 90% than the Average Selling Price</a:t>
+            </a:r>
+            <a:endParaRPr sz="1600" b="1" i="1" dirty="0"/>
+          </a:p>
+        </p:txBody>
+      </p:sp>
+      <p:pic>
+        <p:nvPicPr>
+          <p:cNvPr id="3" name="Picture 2">
+            <a:extLst>
+              <a:ext uri="{FF2B5EF4-FFF2-40B4-BE49-F238E27FC236}">
+                <a16:creationId xmlns:a16="http://schemas.microsoft.com/office/drawing/2014/main" id="{5813D3B7-A65F-F741-A4A9-191DB4909C0D}"/>
+              </a:ext>
+            </a:extLst>
+          </p:cNvPr>
+          <p:cNvPicPr>
+            <a:picLocks noChangeAspect="1"/>
+          </p:cNvPicPr>
+          <p:nvPr/>
+        </p:nvPicPr>
+        <p:blipFill>
+          <a:blip r:embed="rId3"/>
+          <a:stretch>
+            <a:fillRect/>
+          </a:stretch>
+        </p:blipFill>
+        <p:spPr>
+          <a:xfrm>
+            <a:off x="87305" y="924900"/>
+            <a:ext cx="4663682" cy="4218600"/>
+          </a:xfrm>
+          <a:prstGeom prst="rect">
+            <a:avLst/>
+          </a:prstGeom>
+        </p:spPr>
+      </p:pic>
+    </p:spTree>
+    <p:extLst>
+      <p:ext uri="{BB962C8B-B14F-4D97-AF65-F5344CB8AC3E}">
+        <p14:creationId xmlns:p14="http://schemas.microsoft.com/office/powerpoint/2010/main" val="827716662"/>
+      </p:ext>
+    </p:extLst>
+  </p:cSld>
+  <p:clrMapOvr>
+    <a:masterClrMapping/>
+  </p:clrMapOvr>
+</p:sld>
+</file>
+
+<file path=ppt/slides/slide7.xml><?xml version="1.0" encoding="utf-8"?>
+<p:sld xmlns:a="http://schemas.openxmlformats.org/drawingml/2006/main" xmlns:r="http://schemas.openxmlformats.org/officeDocument/2006/relationships" xmlns:p="http://schemas.openxmlformats.org/presentationml/2006/main">
+  <p:cSld>
+    <p:spTree>
+      <p:nvGrpSpPr>
+        <p:cNvPr id="1" name="Shape 122"/>
+        <p:cNvGrpSpPr/>
+        <p:nvPr/>
+      </p:nvGrpSpPr>
+      <p:grpSpPr>
+        <a:xfrm>
+          <a:off x="0" y="0"/>
+          <a:ext cx="0" cy="0"/>
+          <a:chOff x="0" y="0"/>
+          <a:chExt cx="0" cy="0"/>
+        </a:xfrm>
+      </p:grpSpPr>
+      <p:sp>
+        <p:nvSpPr>
+          <p:cNvPr id="123" name="Google Shape;123;p17"/>
+          <p:cNvSpPr txBox="1">
+            <a:spLocks noGrp="1"/>
+          </p:cNvSpPr>
+          <p:nvPr>
+            <p:ph type="title"/>
+          </p:nvPr>
+        </p:nvSpPr>
+        <p:spPr>
+          <a:xfrm>
+            <a:off x="311700" y="410000"/>
             <a:ext cx="8124634" cy="472595"/>
           </a:xfrm>
           <a:prstGeom prst="rect">
@@ -11711,7 +12224,7 @@
 </p:sld>
 </file>
 
-<file path=ppt/slides/slide7.xml><?xml version="1.0" encoding="utf-8"?>
+<file path=ppt/slides/slide8.xml><?xml version="1.0" encoding="utf-8"?>
 <p:sld xmlns:a="http://schemas.openxmlformats.org/drawingml/2006/main" xmlns:r="http://schemas.openxmlformats.org/officeDocument/2006/relationships" xmlns:p="http://schemas.openxmlformats.org/presentationml/2006/main">
   <p:cSld>
     <p:spTree>
@@ -11945,7 +12458,7 @@
 </p:sld>
 </file>
 
-<file path=ppt/slides/slide8.xml><?xml version="1.0" encoding="utf-8"?>
+<file path=ppt/slides/slide9.xml><?xml version="1.0" encoding="utf-8"?>
 <p:sld xmlns:a="http://schemas.openxmlformats.org/drawingml/2006/main" xmlns:r="http://schemas.openxmlformats.org/officeDocument/2006/relationships" xmlns:p="http://schemas.openxmlformats.org/presentationml/2006/main">
   <p:cSld>
     <p:spTree>
@@ -12112,217 +12625,6 @@
           <a:ln>
             <a:noFill/>
           </a:ln>
-        </p:spPr>
-      </p:pic>
-    </p:spTree>
-  </p:cSld>
-  <p:clrMapOvr>
-    <a:masterClrMapping/>
-  </p:clrMapOvr>
-</p:sld>
-</file>
-
-<file path=ppt/slides/slide9.xml><?xml version="1.0" encoding="utf-8"?>
-<p:sld xmlns:a="http://schemas.openxmlformats.org/drawingml/2006/main" xmlns:r="http://schemas.openxmlformats.org/officeDocument/2006/relationships" xmlns:p="http://schemas.openxmlformats.org/presentationml/2006/main">
-  <p:cSld>
-    <p:spTree>
-      <p:nvGrpSpPr>
-        <p:cNvPr id="1" name="Shape 150"/>
-        <p:cNvGrpSpPr/>
-        <p:nvPr/>
-      </p:nvGrpSpPr>
-      <p:grpSpPr>
-        <a:xfrm>
-          <a:off x="0" y="0"/>
-          <a:ext cx="0" cy="0"/>
-          <a:chOff x="0" y="0"/>
-          <a:chExt cx="0" cy="0"/>
-        </a:xfrm>
-      </p:grpSpPr>
-      <p:sp>
-        <p:nvSpPr>
-          <p:cNvPr id="151" name="Google Shape;151;p20"/>
-          <p:cNvSpPr txBox="1">
-            <a:spLocks noGrp="1"/>
-          </p:cNvSpPr>
-          <p:nvPr>
-            <p:ph type="title"/>
-          </p:nvPr>
-        </p:nvSpPr>
-        <p:spPr>
-          <a:xfrm>
-            <a:off x="311700" y="595775"/>
-            <a:ext cx="8520600" cy="607800"/>
-          </a:xfrm>
-          <a:prstGeom prst="rect">
-            <a:avLst/>
-          </a:prstGeom>
-        </p:spPr>
-        <p:txBody>
-          <a:bodyPr spcFirstLastPara="1" wrap="square" lIns="91425" tIns="91425" rIns="91425" bIns="91425" anchor="t" anchorCtr="0">
-            <a:normAutofit fontScale="90000"/>
-          </a:bodyPr>
-          <a:lstStyle/>
-          <a:p>
-            <a:pPr marL="0" lvl="0" indent="0" algn="l" rtl="0">
-              <a:spcBef>
-                <a:spcPts val="0"/>
-              </a:spcBef>
-              <a:spcAft>
-                <a:spcPts val="0"/>
-              </a:spcAft>
-              <a:buNone/>
-            </a:pPr>
-            <a:r>
-              <a:rPr lang="en"/>
-              <a:t>The Neighborhood..</a:t>
-            </a:r>
-            <a:endParaRPr/>
-          </a:p>
-        </p:txBody>
-      </p:sp>
-      <p:sp>
-        <p:nvSpPr>
-          <p:cNvPr id="152" name="Google Shape;152;p20"/>
-          <p:cNvSpPr txBox="1">
-            <a:spLocks noGrp="1"/>
-          </p:cNvSpPr>
-          <p:nvPr>
-            <p:ph type="body" idx="4294967295"/>
-          </p:nvPr>
-        </p:nvSpPr>
-        <p:spPr>
-          <a:xfrm>
-            <a:off x="4634200" y="159600"/>
-            <a:ext cx="4113900" cy="1342800"/>
-          </a:xfrm>
-          <a:prstGeom prst="rect">
-            <a:avLst/>
-          </a:prstGeom>
-        </p:spPr>
-        <p:txBody>
-          <a:bodyPr spcFirstLastPara="1" wrap="square" lIns="91425" tIns="91425" rIns="91425" bIns="91425" anchor="t" anchorCtr="0">
-            <a:normAutofit lnSpcReduction="10000"/>
-          </a:bodyPr>
-          <a:lstStyle/>
-          <a:p>
-            <a:pPr marL="0" lvl="0" indent="0" algn="l" rtl="0">
-              <a:spcBef>
-                <a:spcPts val="0"/>
-              </a:spcBef>
-              <a:spcAft>
-                <a:spcPts val="800"/>
-              </a:spcAft>
-              <a:buNone/>
-            </a:pPr>
-            <a:r>
-              <a:rPr lang="en" sz="1600" b="1">
-                <a:solidFill>
-                  <a:schemeClr val="dk1"/>
-                </a:solidFill>
-              </a:rPr>
-              <a:t>NAmes</a:t>
-            </a:r>
-            <a:r>
-              <a:rPr lang="en" sz="1600"/>
-              <a:t> and </a:t>
-            </a:r>
-            <a:r>
-              <a:rPr lang="en" sz="1600" b="1">
-                <a:solidFill>
-                  <a:srgbClr val="E69138"/>
-                </a:solidFill>
-              </a:rPr>
-              <a:t>CollgCr</a:t>
-            </a:r>
-            <a:r>
-              <a:rPr lang="en" sz="1600"/>
-              <a:t> are top 2 neighborhoods that have most numbers of sold properties over 4 years. </a:t>
-            </a:r>
-            <a:r>
-              <a:rPr lang="en" sz="1600" b="1">
-                <a:solidFill>
-                  <a:srgbClr val="E69138"/>
-                </a:solidFill>
-              </a:rPr>
-              <a:t>CollgCr</a:t>
-            </a:r>
-            <a:r>
-              <a:rPr lang="en" sz="1600"/>
-              <a:t> has  better quality rating than </a:t>
-            </a:r>
-            <a:r>
-              <a:rPr lang="en" sz="1600" b="1">
-                <a:solidFill>
-                  <a:schemeClr val="dk1"/>
-                </a:solidFill>
-              </a:rPr>
-              <a:t>NAmes</a:t>
-            </a:r>
-            <a:r>
-              <a:rPr lang="en" sz="1600"/>
-              <a:t>.</a:t>
-            </a:r>
-            <a:endParaRPr sz="1600"/>
-          </a:p>
-        </p:txBody>
-      </p:sp>
-      <p:pic>
-        <p:nvPicPr>
-          <p:cNvPr id="156" name="Google Shape;156;p20"/>
-          <p:cNvPicPr preferRelativeResize="0"/>
-          <p:nvPr/>
-        </p:nvPicPr>
-        <p:blipFill>
-          <a:blip r:embed="rId3">
-            <a:alphaModFix/>
-          </a:blip>
-          <a:stretch>
-            <a:fillRect/>
-          </a:stretch>
-        </p:blipFill>
-        <p:spPr>
-          <a:xfrm>
-            <a:off x="4634188" y="1795525"/>
-            <a:ext cx="3950438" cy="2875725"/>
-          </a:xfrm>
-          <a:prstGeom prst="rect">
-            <a:avLst/>
-          </a:prstGeom>
-          <a:noFill/>
-          <a:ln>
-            <a:noFill/>
-          </a:ln>
-        </p:spPr>
-      </p:pic>
-      <p:pic>
-        <p:nvPicPr>
-          <p:cNvPr id="2" name="Picture 1">
-            <a:extLst>
-              <a:ext uri="{FF2B5EF4-FFF2-40B4-BE49-F238E27FC236}">
-                <a16:creationId xmlns:a16="http://schemas.microsoft.com/office/drawing/2014/main" id="{63E774B9-7659-C045-AE6F-6F1DB209FE69}"/>
-              </a:ext>
-            </a:extLst>
-          </p:cNvPr>
-          <p:cNvPicPr>
-            <a:picLocks noChangeAspect="1"/>
-          </p:cNvPicPr>
-          <p:nvPr/>
-        </p:nvPicPr>
-        <p:blipFill>
-          <a:blip r:embed="rId4"/>
-          <a:stretch>
-            <a:fillRect/>
-          </a:stretch>
-        </p:blipFill>
-        <p:spPr>
-          <a:xfrm>
-            <a:off x="0" y="1203575"/>
-            <a:ext cx="4762831" cy="3604775"/>
-          </a:xfrm>
-          <a:prstGeom prst="rect">
-            <a:avLst/>
-          </a:prstGeom>
         </p:spPr>
       </p:pic>
     </p:spTree>

</xml_diff>